<commit_message>
streams have been wrangled
</commit_message>
<xml_diff>
--- a/Tervek/ui-terv.pptx
+++ b/Tervek/ui-terv.pptx
@@ -105,6 +105,11 @@
       </a:defRPr>
     </a:lvl9pPr>
   </p:defaultTextStyle>
+  <p:extLst>
+    <p:ext uri="{EFAFB233-063F-42B5-8137-9DF3F51BA10A}">
+      <p15:sldGuideLst xmlns:p15="http://schemas.microsoft.com/office/powerpoint/2012/main"/>
+    </p:ext>
+  </p:extLst>
 </p:presentation>
 </file>
 
@@ -239,7 +244,7 @@
           <a:p>
             <a:fld id="{4EA07C61-72C1-4B0F-B28F-4EAAE2D57413}" type="datetimeFigureOut">
               <a:rPr lang="en-GB" smtClean="0"/>
-              <a:t>2024-03-07</a:t>
+              <a:t>2024-10-07</a:t>
             </a:fld>
             <a:endParaRPr lang="en-GB"/>
           </a:p>
@@ -409,7 +414,7 @@
           <a:p>
             <a:fld id="{4EA07C61-72C1-4B0F-B28F-4EAAE2D57413}" type="datetimeFigureOut">
               <a:rPr lang="en-GB" smtClean="0"/>
-              <a:t>2024-03-07</a:t>
+              <a:t>2024-10-07</a:t>
             </a:fld>
             <a:endParaRPr lang="en-GB"/>
           </a:p>
@@ -589,7 +594,7 @@
           <a:p>
             <a:fld id="{4EA07C61-72C1-4B0F-B28F-4EAAE2D57413}" type="datetimeFigureOut">
               <a:rPr lang="en-GB" smtClean="0"/>
-              <a:t>2024-03-07</a:t>
+              <a:t>2024-10-07</a:t>
             </a:fld>
             <a:endParaRPr lang="en-GB"/>
           </a:p>
@@ -759,7 +764,7 @@
           <a:p>
             <a:fld id="{4EA07C61-72C1-4B0F-B28F-4EAAE2D57413}" type="datetimeFigureOut">
               <a:rPr lang="en-GB" smtClean="0"/>
-              <a:t>2024-03-07</a:t>
+              <a:t>2024-10-07</a:t>
             </a:fld>
             <a:endParaRPr lang="en-GB"/>
           </a:p>
@@ -1005,7 +1010,7 @@
           <a:p>
             <a:fld id="{4EA07C61-72C1-4B0F-B28F-4EAAE2D57413}" type="datetimeFigureOut">
               <a:rPr lang="en-GB" smtClean="0"/>
-              <a:t>2024-03-07</a:t>
+              <a:t>2024-10-07</a:t>
             </a:fld>
             <a:endParaRPr lang="en-GB"/>
           </a:p>
@@ -1237,7 +1242,7 @@
           <a:p>
             <a:fld id="{4EA07C61-72C1-4B0F-B28F-4EAAE2D57413}" type="datetimeFigureOut">
               <a:rPr lang="en-GB" smtClean="0"/>
-              <a:t>2024-03-07</a:t>
+              <a:t>2024-10-07</a:t>
             </a:fld>
             <a:endParaRPr lang="en-GB"/>
           </a:p>
@@ -1604,7 +1609,7 @@
           <a:p>
             <a:fld id="{4EA07C61-72C1-4B0F-B28F-4EAAE2D57413}" type="datetimeFigureOut">
               <a:rPr lang="en-GB" smtClean="0"/>
-              <a:t>2024-03-07</a:t>
+              <a:t>2024-10-07</a:t>
             </a:fld>
             <a:endParaRPr lang="en-GB"/>
           </a:p>
@@ -1722,7 +1727,7 @@
           <a:p>
             <a:fld id="{4EA07C61-72C1-4B0F-B28F-4EAAE2D57413}" type="datetimeFigureOut">
               <a:rPr lang="en-GB" smtClean="0"/>
-              <a:t>2024-03-07</a:t>
+              <a:t>2024-10-07</a:t>
             </a:fld>
             <a:endParaRPr lang="en-GB"/>
           </a:p>
@@ -1817,7 +1822,7 @@
           <a:p>
             <a:fld id="{4EA07C61-72C1-4B0F-B28F-4EAAE2D57413}" type="datetimeFigureOut">
               <a:rPr lang="en-GB" smtClean="0"/>
-              <a:t>2024-03-07</a:t>
+              <a:t>2024-10-07</a:t>
             </a:fld>
             <a:endParaRPr lang="en-GB"/>
           </a:p>
@@ -2094,7 +2099,7 @@
           <a:p>
             <a:fld id="{4EA07C61-72C1-4B0F-B28F-4EAAE2D57413}" type="datetimeFigureOut">
               <a:rPr lang="en-GB" smtClean="0"/>
-              <a:t>2024-03-07</a:t>
+              <a:t>2024-10-07</a:t>
             </a:fld>
             <a:endParaRPr lang="en-GB"/>
           </a:p>
@@ -2351,7 +2356,7 @@
           <a:p>
             <a:fld id="{4EA07C61-72C1-4B0F-B28F-4EAAE2D57413}" type="datetimeFigureOut">
               <a:rPr lang="en-GB" smtClean="0"/>
-              <a:t>2024-03-07</a:t>
+              <a:t>2024-10-07</a:t>
             </a:fld>
             <a:endParaRPr lang="en-GB"/>
           </a:p>
@@ -2570,7 +2575,7 @@
           <a:p>
             <a:fld id="{4EA07C61-72C1-4B0F-B28F-4EAAE2D57413}" type="datetimeFigureOut">
               <a:rPr lang="en-GB" smtClean="0"/>
-              <a:t>2024-03-07</a:t>
+              <a:t>2024-10-07</a:t>
             </a:fld>
             <a:endParaRPr lang="en-GB"/>
           </a:p>
@@ -3602,6 +3607,785 @@
           <a:chExt cx="0" cy="0"/>
         </a:xfrm>
       </p:grpSpPr>
+      <p:sp>
+        <p:nvSpPr>
+          <p:cNvPr id="22" name="Téglalap: lekerekített 21">
+            <a:extLst>
+              <a:ext uri="{FF2B5EF4-FFF2-40B4-BE49-F238E27FC236}">
+                <a16:creationId xmlns:a16="http://schemas.microsoft.com/office/drawing/2014/main" id="{FC9508D7-F714-F898-6A1B-7A4B478BBAB6}"/>
+              </a:ext>
+            </a:extLst>
+          </p:cNvPr>
+          <p:cNvSpPr/>
+          <p:nvPr/>
+        </p:nvSpPr>
+        <p:spPr>
+          <a:xfrm>
+            <a:off x="571500" y="1912442"/>
+            <a:ext cx="5577840" cy="1114800"/>
+          </a:xfrm>
+          <a:prstGeom prst="roundRect">
+            <a:avLst/>
+          </a:prstGeom>
+          <a:solidFill>
+            <a:schemeClr val="tx1">
+              <a:lumMod val="75000"/>
+              <a:lumOff val="25000"/>
+            </a:schemeClr>
+          </a:solidFill>
+          <a:ln>
+            <a:noFill/>
+          </a:ln>
+          <a:effectLst>
+            <a:outerShdw blurRad="63500" algn="ctr" rotWithShape="0">
+              <a:prstClr val="black">
+                <a:alpha val="27000"/>
+              </a:prstClr>
+            </a:outerShdw>
+          </a:effectLst>
+        </p:spPr>
+        <p:style>
+          <a:lnRef idx="2">
+            <a:schemeClr val="accent1">
+              <a:shade val="15000"/>
+            </a:schemeClr>
+          </a:lnRef>
+          <a:fillRef idx="1">
+            <a:schemeClr val="accent1"/>
+          </a:fillRef>
+          <a:effectRef idx="0">
+            <a:schemeClr val="accent1"/>
+          </a:effectRef>
+          <a:fontRef idx="minor">
+            <a:schemeClr val="lt1"/>
+          </a:fontRef>
+        </p:style>
+        <p:txBody>
+          <a:bodyPr rtlCol="0" anchor="ctr"/>
+          <a:lstStyle/>
+          <a:p>
+            <a:pPr algn="ctr"/>
+            <a:endParaRPr lang="en-GB"/>
+          </a:p>
+        </p:txBody>
+      </p:sp>
+      <p:sp>
+        <p:nvSpPr>
+          <p:cNvPr id="2" name="Szövegdoboz 1">
+            <a:extLst>
+              <a:ext uri="{FF2B5EF4-FFF2-40B4-BE49-F238E27FC236}">
+                <a16:creationId xmlns:a16="http://schemas.microsoft.com/office/drawing/2014/main" id="{583FD146-8AE6-3451-F60C-0FF5D3A8A74A}"/>
+              </a:ext>
+            </a:extLst>
+          </p:cNvPr>
+          <p:cNvSpPr txBox="1"/>
+          <p:nvPr/>
+        </p:nvSpPr>
+        <p:spPr>
+          <a:xfrm>
+            <a:off x="708660" y="2153954"/>
+            <a:ext cx="4821384" cy="646331"/>
+          </a:xfrm>
+          <a:prstGeom prst="rect">
+            <a:avLst/>
+          </a:prstGeom>
+          <a:noFill/>
+        </p:spPr>
+        <p:txBody>
+          <a:bodyPr wrap="none" rtlCol="0">
+            <a:spAutoFit/>
+          </a:bodyPr>
+          <a:lstStyle/>
+          <a:p>
+            <a:r>
+              <a:rPr lang="en-GB" sz="3600" dirty="0">
+                <a:solidFill>
+                  <a:schemeClr val="bg1"/>
+                </a:solidFill>
+              </a:rPr>
+              <a:t>Online </a:t>
+            </a:r>
+            <a:r>
+              <a:rPr lang="en-GB" sz="3600" dirty="0" err="1">
+                <a:solidFill>
+                  <a:schemeClr val="bg1"/>
+                </a:solidFill>
+              </a:rPr>
+              <a:t>tárak</a:t>
+            </a:r>
+            <a:r>
+              <a:rPr lang="en-GB" sz="3600" dirty="0">
+                <a:solidFill>
+                  <a:schemeClr val="bg1"/>
+                </a:solidFill>
+              </a:rPr>
+              <a:t> </a:t>
+            </a:r>
+            <a:r>
+              <a:rPr lang="en-GB" sz="3600" dirty="0" err="1">
+                <a:solidFill>
+                  <a:schemeClr val="bg1"/>
+                </a:solidFill>
+              </a:rPr>
+              <a:t>letöltése</a:t>
+            </a:r>
+            <a:r>
+              <a:rPr lang="en-GB" sz="3600" dirty="0">
+                <a:solidFill>
+                  <a:schemeClr val="bg1"/>
+                </a:solidFill>
+              </a:rPr>
+              <a:t>…</a:t>
+            </a:r>
+          </a:p>
+        </p:txBody>
+      </p:sp>
+      <p:sp>
+        <p:nvSpPr>
+          <p:cNvPr id="3" name="Szövegdoboz 2">
+            <a:extLst>
+              <a:ext uri="{FF2B5EF4-FFF2-40B4-BE49-F238E27FC236}">
+                <a16:creationId xmlns:a16="http://schemas.microsoft.com/office/drawing/2014/main" id="{9938C153-A287-4666-71B0-D53766CD440D}"/>
+              </a:ext>
+            </a:extLst>
+          </p:cNvPr>
+          <p:cNvSpPr txBox="1"/>
+          <p:nvPr/>
+        </p:nvSpPr>
+        <p:spPr>
+          <a:xfrm>
+            <a:off x="1507352" y="3300710"/>
+            <a:ext cx="3241593" cy="3261855"/>
+          </a:xfrm>
+          <a:prstGeom prst="rect">
+            <a:avLst/>
+          </a:prstGeom>
+          <a:noFill/>
+        </p:spPr>
+        <p:txBody>
+          <a:bodyPr wrap="none" rtlCol="0">
+            <a:spAutoFit/>
+          </a:bodyPr>
+          <a:lstStyle/>
+          <a:p>
+            <a:pPr>
+              <a:lnSpc>
+                <a:spcPct val="150000"/>
+              </a:lnSpc>
+            </a:pPr>
+            <a:r>
+              <a:rPr lang="en-GB" sz="2800" dirty="0" err="1">
+                <a:solidFill>
+                  <a:schemeClr val="bg1"/>
+                </a:solidFill>
+              </a:rPr>
+              <a:t>Sófár</a:t>
+            </a:r>
+            <a:r>
+              <a:rPr lang="en-GB" sz="2800" dirty="0">
+                <a:solidFill>
+                  <a:schemeClr val="bg1"/>
+                </a:solidFill>
+              </a:rPr>
+              <a:t> </a:t>
+            </a:r>
+            <a:r>
+              <a:rPr lang="en-GB" sz="2800" dirty="0" err="1">
+                <a:solidFill>
+                  <a:schemeClr val="bg1"/>
+                </a:solidFill>
+              </a:rPr>
+              <a:t>Kottatár</a:t>
+            </a:r>
+            <a:endParaRPr lang="en-GB" sz="2800" dirty="0">
+              <a:solidFill>
+                <a:schemeClr val="bg1"/>
+              </a:solidFill>
+            </a:endParaRPr>
+          </a:p>
+          <a:p>
+            <a:pPr>
+              <a:lnSpc>
+                <a:spcPct val="150000"/>
+              </a:lnSpc>
+            </a:pPr>
+            <a:r>
+              <a:rPr lang="en-GB" sz="2800" dirty="0" err="1">
+                <a:solidFill>
+                  <a:schemeClr val="bg1"/>
+                </a:solidFill>
+              </a:rPr>
+              <a:t>Teszt</a:t>
+            </a:r>
+            <a:r>
+              <a:rPr lang="en-GB" sz="2800" dirty="0">
+                <a:solidFill>
+                  <a:schemeClr val="bg1"/>
+                </a:solidFill>
+              </a:rPr>
+              <a:t> </a:t>
+            </a:r>
+            <a:r>
+              <a:rPr lang="en-GB" sz="2800" dirty="0" err="1">
+                <a:solidFill>
+                  <a:schemeClr val="bg1"/>
+                </a:solidFill>
+              </a:rPr>
+              <a:t>Tár</a:t>
+            </a:r>
+            <a:endParaRPr lang="en-GB" sz="2800" dirty="0">
+              <a:solidFill>
+                <a:schemeClr val="bg1"/>
+              </a:solidFill>
+            </a:endParaRPr>
+          </a:p>
+          <a:p>
+            <a:pPr>
+              <a:lnSpc>
+                <a:spcPct val="150000"/>
+              </a:lnSpc>
+            </a:pPr>
+            <a:r>
+              <a:rPr lang="en-GB" sz="2800" dirty="0" err="1">
+                <a:solidFill>
+                  <a:schemeClr val="bg1"/>
+                </a:solidFill>
+              </a:rPr>
+              <a:t>Refisz</a:t>
+            </a:r>
+            <a:r>
+              <a:rPr lang="en-GB" sz="2800" dirty="0">
+                <a:solidFill>
+                  <a:schemeClr val="bg1"/>
+                </a:solidFill>
+              </a:rPr>
+              <a:t> </a:t>
+            </a:r>
+            <a:r>
+              <a:rPr lang="en-GB" sz="2800" dirty="0" err="1">
+                <a:solidFill>
+                  <a:schemeClr val="bg1"/>
+                </a:solidFill>
+              </a:rPr>
+              <a:t>Kottatár</a:t>
+            </a:r>
+            <a:endParaRPr lang="en-GB" sz="2800" dirty="0">
+              <a:solidFill>
+                <a:schemeClr val="bg1"/>
+              </a:solidFill>
+            </a:endParaRPr>
+          </a:p>
+          <a:p>
+            <a:pPr>
+              <a:lnSpc>
+                <a:spcPct val="150000"/>
+              </a:lnSpc>
+            </a:pPr>
+            <a:r>
+              <a:rPr lang="en-GB" sz="2800" dirty="0">
+                <a:solidFill>
+                  <a:schemeClr val="bg1"/>
+                </a:solidFill>
+              </a:rPr>
+              <a:t>csecsy.hu</a:t>
+            </a:r>
+          </a:p>
+          <a:p>
+            <a:pPr>
+              <a:lnSpc>
+                <a:spcPct val="150000"/>
+              </a:lnSpc>
+            </a:pPr>
+            <a:r>
+              <a:rPr lang="en-GB" sz="2800" dirty="0">
+                <a:solidFill>
+                  <a:schemeClr val="bg1"/>
+                </a:solidFill>
+              </a:rPr>
+              <a:t>Benedek </a:t>
+            </a:r>
+            <a:r>
+              <a:rPr lang="en-GB" sz="2800" dirty="0" err="1">
+                <a:solidFill>
+                  <a:schemeClr val="bg1"/>
+                </a:solidFill>
+              </a:rPr>
+              <a:t>OpenSong</a:t>
+            </a:r>
+            <a:endParaRPr lang="en-GB" sz="2800" dirty="0">
+              <a:solidFill>
+                <a:schemeClr val="bg1"/>
+              </a:solidFill>
+            </a:endParaRPr>
+          </a:p>
+        </p:txBody>
+      </p:sp>
+      <p:sp>
+        <p:nvSpPr>
+          <p:cNvPr id="14" name="Szabadkézi sokszög: alakzat 13">
+            <a:extLst>
+              <a:ext uri="{FF2B5EF4-FFF2-40B4-BE49-F238E27FC236}">
+                <a16:creationId xmlns:a16="http://schemas.microsoft.com/office/drawing/2014/main" id="{36072419-FBB2-513A-C001-E6569B90A297}"/>
+              </a:ext>
+            </a:extLst>
+          </p:cNvPr>
+          <p:cNvSpPr/>
+          <p:nvPr/>
+        </p:nvSpPr>
+        <p:spPr>
+          <a:xfrm rot="16200000">
+            <a:off x="1019786" y="5450501"/>
+            <a:ext cx="322600" cy="322600"/>
+          </a:xfrm>
+          <a:custGeom>
+            <a:avLst/>
+            <a:gdLst>
+              <a:gd name="connsiteX0" fmla="*/ 285750 w 571500"/>
+              <a:gd name="connsiteY0" fmla="*/ 0 h 571500"/>
+              <a:gd name="connsiteX1" fmla="*/ 285750 w 571500"/>
+              <a:gd name="connsiteY1" fmla="*/ 142875 h 571500"/>
+              <a:gd name="connsiteX2" fmla="*/ 142875 w 571500"/>
+              <a:gd name="connsiteY2" fmla="*/ 285750 h 571500"/>
+              <a:gd name="connsiteX3" fmla="*/ 285750 w 571500"/>
+              <a:gd name="connsiteY3" fmla="*/ 428625 h 571500"/>
+              <a:gd name="connsiteX4" fmla="*/ 428625 w 571500"/>
+              <a:gd name="connsiteY4" fmla="*/ 285750 h 571500"/>
+              <a:gd name="connsiteX5" fmla="*/ 571500 w 571500"/>
+              <a:gd name="connsiteY5" fmla="*/ 285750 h 571500"/>
+              <a:gd name="connsiteX6" fmla="*/ 285750 w 571500"/>
+              <a:gd name="connsiteY6" fmla="*/ 571500 h 571500"/>
+              <a:gd name="connsiteX7" fmla="*/ 0 w 571500"/>
+              <a:gd name="connsiteY7" fmla="*/ 285750 h 571500"/>
+              <a:gd name="connsiteX8" fmla="*/ 285750 w 571500"/>
+              <a:gd name="connsiteY8" fmla="*/ 0 h 571500"/>
+            </a:gdLst>
+            <a:ahLst/>
+            <a:cxnLst>
+              <a:cxn ang="0">
+                <a:pos x="connsiteX0" y="connsiteY0"/>
+              </a:cxn>
+              <a:cxn ang="0">
+                <a:pos x="connsiteX1" y="connsiteY1"/>
+              </a:cxn>
+              <a:cxn ang="0">
+                <a:pos x="connsiteX2" y="connsiteY2"/>
+              </a:cxn>
+              <a:cxn ang="0">
+                <a:pos x="connsiteX3" y="connsiteY3"/>
+              </a:cxn>
+              <a:cxn ang="0">
+                <a:pos x="connsiteX4" y="connsiteY4"/>
+              </a:cxn>
+              <a:cxn ang="0">
+                <a:pos x="connsiteX5" y="connsiteY5"/>
+              </a:cxn>
+              <a:cxn ang="0">
+                <a:pos x="connsiteX6" y="connsiteY6"/>
+              </a:cxn>
+              <a:cxn ang="0">
+                <a:pos x="connsiteX7" y="connsiteY7"/>
+              </a:cxn>
+              <a:cxn ang="0">
+                <a:pos x="connsiteX8" y="connsiteY8"/>
+              </a:cxn>
+            </a:cxnLst>
+            <a:rect l="l" t="t" r="r" b="b"/>
+            <a:pathLst>
+              <a:path w="571500" h="571500">
+                <a:moveTo>
+                  <a:pt x="285750" y="0"/>
+                </a:moveTo>
+                <a:lnTo>
+                  <a:pt x="285750" y="142875"/>
+                </a:lnTo>
+                <a:cubicBezTo>
+                  <a:pt x="206842" y="142875"/>
+                  <a:pt x="142875" y="206842"/>
+                  <a:pt x="142875" y="285750"/>
+                </a:cubicBezTo>
+                <a:cubicBezTo>
+                  <a:pt x="142875" y="364658"/>
+                  <a:pt x="206842" y="428625"/>
+                  <a:pt x="285750" y="428625"/>
+                </a:cubicBezTo>
+                <a:cubicBezTo>
+                  <a:pt x="364658" y="428625"/>
+                  <a:pt x="428625" y="364658"/>
+                  <a:pt x="428625" y="285750"/>
+                </a:cubicBezTo>
+                <a:lnTo>
+                  <a:pt x="571500" y="285750"/>
+                </a:lnTo>
+                <a:cubicBezTo>
+                  <a:pt x="571500" y="443565"/>
+                  <a:pt x="443565" y="571500"/>
+                  <a:pt x="285750" y="571500"/>
+                </a:cubicBezTo>
+                <a:cubicBezTo>
+                  <a:pt x="127935" y="571500"/>
+                  <a:pt x="0" y="443565"/>
+                  <a:pt x="0" y="285750"/>
+                </a:cubicBezTo>
+                <a:cubicBezTo>
+                  <a:pt x="0" y="127935"/>
+                  <a:pt x="127935" y="0"/>
+                  <a:pt x="285750" y="0"/>
+                </a:cubicBezTo>
+                <a:close/>
+              </a:path>
+            </a:pathLst>
+          </a:custGeom>
+          <a:solidFill>
+            <a:srgbClr val="FFC000"/>
+          </a:solidFill>
+          <a:ln>
+            <a:noFill/>
+          </a:ln>
+        </p:spPr>
+        <p:style>
+          <a:lnRef idx="2">
+            <a:schemeClr val="accent1">
+              <a:shade val="15000"/>
+            </a:schemeClr>
+          </a:lnRef>
+          <a:fillRef idx="1">
+            <a:schemeClr val="accent1"/>
+          </a:fillRef>
+          <a:effectRef idx="0">
+            <a:schemeClr val="accent1"/>
+          </a:effectRef>
+          <a:fontRef idx="minor">
+            <a:schemeClr val="lt1"/>
+          </a:fontRef>
+        </p:style>
+        <p:txBody>
+          <a:bodyPr wrap="square" rtlCol="0" anchor="ctr">
+            <a:noAutofit/>
+          </a:bodyPr>
+          <a:lstStyle/>
+          <a:p>
+            <a:pPr algn="ctr"/>
+            <a:endParaRPr lang="en-GB">
+              <a:solidFill>
+                <a:schemeClr val="tx1"/>
+              </a:solidFill>
+            </a:endParaRPr>
+          </a:p>
+        </p:txBody>
+      </p:sp>
+      <p:sp>
+        <p:nvSpPr>
+          <p:cNvPr id="15" name="Szabadkézi sokszög: alakzat 14">
+            <a:extLst>
+              <a:ext uri="{FF2B5EF4-FFF2-40B4-BE49-F238E27FC236}">
+                <a16:creationId xmlns:a16="http://schemas.microsoft.com/office/drawing/2014/main" id="{0A2764D6-D6BA-ECD0-B439-D95BFE5018FB}"/>
+              </a:ext>
+            </a:extLst>
+          </p:cNvPr>
+          <p:cNvSpPr/>
+          <p:nvPr/>
+        </p:nvSpPr>
+        <p:spPr>
+          <a:xfrm rot="3905854">
+            <a:off x="1019786" y="6083913"/>
+            <a:ext cx="322600" cy="322600"/>
+          </a:xfrm>
+          <a:custGeom>
+            <a:avLst/>
+            <a:gdLst>
+              <a:gd name="connsiteX0" fmla="*/ 285750 w 571500"/>
+              <a:gd name="connsiteY0" fmla="*/ 0 h 571500"/>
+              <a:gd name="connsiteX1" fmla="*/ 285750 w 571500"/>
+              <a:gd name="connsiteY1" fmla="*/ 142875 h 571500"/>
+              <a:gd name="connsiteX2" fmla="*/ 142875 w 571500"/>
+              <a:gd name="connsiteY2" fmla="*/ 285750 h 571500"/>
+              <a:gd name="connsiteX3" fmla="*/ 285750 w 571500"/>
+              <a:gd name="connsiteY3" fmla="*/ 428625 h 571500"/>
+              <a:gd name="connsiteX4" fmla="*/ 428625 w 571500"/>
+              <a:gd name="connsiteY4" fmla="*/ 285750 h 571500"/>
+              <a:gd name="connsiteX5" fmla="*/ 571500 w 571500"/>
+              <a:gd name="connsiteY5" fmla="*/ 285750 h 571500"/>
+              <a:gd name="connsiteX6" fmla="*/ 285750 w 571500"/>
+              <a:gd name="connsiteY6" fmla="*/ 571500 h 571500"/>
+              <a:gd name="connsiteX7" fmla="*/ 0 w 571500"/>
+              <a:gd name="connsiteY7" fmla="*/ 285750 h 571500"/>
+              <a:gd name="connsiteX8" fmla="*/ 285750 w 571500"/>
+              <a:gd name="connsiteY8" fmla="*/ 0 h 571500"/>
+            </a:gdLst>
+            <a:ahLst/>
+            <a:cxnLst>
+              <a:cxn ang="0">
+                <a:pos x="connsiteX0" y="connsiteY0"/>
+              </a:cxn>
+              <a:cxn ang="0">
+                <a:pos x="connsiteX1" y="connsiteY1"/>
+              </a:cxn>
+              <a:cxn ang="0">
+                <a:pos x="connsiteX2" y="connsiteY2"/>
+              </a:cxn>
+              <a:cxn ang="0">
+                <a:pos x="connsiteX3" y="connsiteY3"/>
+              </a:cxn>
+              <a:cxn ang="0">
+                <a:pos x="connsiteX4" y="connsiteY4"/>
+              </a:cxn>
+              <a:cxn ang="0">
+                <a:pos x="connsiteX5" y="connsiteY5"/>
+              </a:cxn>
+              <a:cxn ang="0">
+                <a:pos x="connsiteX6" y="connsiteY6"/>
+              </a:cxn>
+              <a:cxn ang="0">
+                <a:pos x="connsiteX7" y="connsiteY7"/>
+              </a:cxn>
+              <a:cxn ang="0">
+                <a:pos x="connsiteX8" y="connsiteY8"/>
+              </a:cxn>
+            </a:cxnLst>
+            <a:rect l="l" t="t" r="r" b="b"/>
+            <a:pathLst>
+              <a:path w="571500" h="571500">
+                <a:moveTo>
+                  <a:pt x="285750" y="0"/>
+                </a:moveTo>
+                <a:lnTo>
+                  <a:pt x="285750" y="142875"/>
+                </a:lnTo>
+                <a:cubicBezTo>
+                  <a:pt x="206842" y="142875"/>
+                  <a:pt x="142875" y="206842"/>
+                  <a:pt x="142875" y="285750"/>
+                </a:cubicBezTo>
+                <a:cubicBezTo>
+                  <a:pt x="142875" y="364658"/>
+                  <a:pt x="206842" y="428625"/>
+                  <a:pt x="285750" y="428625"/>
+                </a:cubicBezTo>
+                <a:cubicBezTo>
+                  <a:pt x="364658" y="428625"/>
+                  <a:pt x="428625" y="364658"/>
+                  <a:pt x="428625" y="285750"/>
+                </a:cubicBezTo>
+                <a:lnTo>
+                  <a:pt x="571500" y="285750"/>
+                </a:lnTo>
+                <a:cubicBezTo>
+                  <a:pt x="571500" y="443565"/>
+                  <a:pt x="443565" y="571500"/>
+                  <a:pt x="285750" y="571500"/>
+                </a:cubicBezTo>
+                <a:cubicBezTo>
+                  <a:pt x="127935" y="571500"/>
+                  <a:pt x="0" y="443565"/>
+                  <a:pt x="0" y="285750"/>
+                </a:cubicBezTo>
+                <a:cubicBezTo>
+                  <a:pt x="0" y="127935"/>
+                  <a:pt x="127935" y="0"/>
+                  <a:pt x="285750" y="0"/>
+                </a:cubicBezTo>
+                <a:close/>
+              </a:path>
+            </a:pathLst>
+          </a:custGeom>
+          <a:solidFill>
+            <a:srgbClr val="FFC000"/>
+          </a:solidFill>
+          <a:ln>
+            <a:noFill/>
+          </a:ln>
+        </p:spPr>
+        <p:style>
+          <a:lnRef idx="2">
+            <a:schemeClr val="accent1">
+              <a:shade val="15000"/>
+            </a:schemeClr>
+          </a:lnRef>
+          <a:fillRef idx="1">
+            <a:schemeClr val="accent1"/>
+          </a:fillRef>
+          <a:effectRef idx="0">
+            <a:schemeClr val="accent1"/>
+          </a:effectRef>
+          <a:fontRef idx="minor">
+            <a:schemeClr val="lt1"/>
+          </a:fontRef>
+        </p:style>
+        <p:txBody>
+          <a:bodyPr wrap="square" rtlCol="0" anchor="ctr">
+            <a:noAutofit/>
+          </a:bodyPr>
+          <a:lstStyle/>
+          <a:p>
+            <a:pPr algn="ctr"/>
+            <a:endParaRPr lang="en-GB">
+              <a:solidFill>
+                <a:schemeClr val="tx1"/>
+              </a:solidFill>
+            </a:endParaRPr>
+          </a:p>
+        </p:txBody>
+      </p:sp>
+      <p:pic>
+        <p:nvPicPr>
+          <p:cNvPr id="17" name="Ábra 16" descr="Pipa egyszínű kitöltéssel">
+            <a:extLst>
+              <a:ext uri="{FF2B5EF4-FFF2-40B4-BE49-F238E27FC236}">
+                <a16:creationId xmlns:a16="http://schemas.microsoft.com/office/drawing/2014/main" id="{72EBFD47-3FEB-A4DC-266B-B44A5907CDA8}"/>
+              </a:ext>
+            </a:extLst>
+          </p:cNvPr>
+          <p:cNvPicPr>
+            <a:picLocks noChangeAspect="1"/>
+          </p:cNvPicPr>
+          <p:nvPr/>
+        </p:nvPicPr>
+        <p:blipFill>
+          <a:blip r:embed="rId2">
+            <a:extLst>
+              <a:ext uri="{96DAC541-7B7A-43D3-8B79-37D633B846F1}">
+                <asvg:svgBlip xmlns:asvg="http://schemas.microsoft.com/office/drawing/2016/SVG/main" r:embed="rId3"/>
+              </a:ext>
+            </a:extLst>
+          </a:blip>
+          <a:stretch>
+            <a:fillRect/>
+          </a:stretch>
+        </p:blipFill>
+        <p:spPr>
+          <a:xfrm>
+            <a:off x="986800" y="3499213"/>
+            <a:ext cx="388572" cy="388572"/>
+          </a:xfrm>
+          <a:prstGeom prst="rect">
+            <a:avLst/>
+          </a:prstGeom>
+        </p:spPr>
+      </p:pic>
+      <p:pic>
+        <p:nvPicPr>
+          <p:cNvPr id="18" name="Ábra 17" descr="Pipa egyszínű kitöltéssel">
+            <a:extLst>
+              <a:ext uri="{FF2B5EF4-FFF2-40B4-BE49-F238E27FC236}">
+                <a16:creationId xmlns:a16="http://schemas.microsoft.com/office/drawing/2014/main" id="{13AB499F-0524-FCB7-32D2-D4CE99112C3D}"/>
+              </a:ext>
+            </a:extLst>
+          </p:cNvPr>
+          <p:cNvPicPr>
+            <a:picLocks noChangeAspect="1"/>
+          </p:cNvPicPr>
+          <p:nvPr/>
+        </p:nvPicPr>
+        <p:blipFill>
+          <a:blip r:embed="rId2">
+            <a:extLst>
+              <a:ext uri="{96DAC541-7B7A-43D3-8B79-37D633B846F1}">
+                <asvg:svgBlip xmlns:asvg="http://schemas.microsoft.com/office/drawing/2016/SVG/main" r:embed="rId3"/>
+              </a:ext>
+            </a:extLst>
+          </a:blip>
+          <a:stretch>
+            <a:fillRect/>
+          </a:stretch>
+        </p:blipFill>
+        <p:spPr>
+          <a:xfrm>
+            <a:off x="989276" y="4144547"/>
+            <a:ext cx="388572" cy="388572"/>
+          </a:xfrm>
+          <a:prstGeom prst="rect">
+            <a:avLst/>
+          </a:prstGeom>
+        </p:spPr>
+      </p:pic>
+      <p:pic>
+        <p:nvPicPr>
+          <p:cNvPr id="19" name="Ábra 18" descr="Pipa egyszínű kitöltéssel">
+            <a:extLst>
+              <a:ext uri="{FF2B5EF4-FFF2-40B4-BE49-F238E27FC236}">
+                <a16:creationId xmlns:a16="http://schemas.microsoft.com/office/drawing/2014/main" id="{27DD2D7C-F272-D6DC-85C2-28D3CF2CACB9}"/>
+              </a:ext>
+            </a:extLst>
+          </p:cNvPr>
+          <p:cNvPicPr>
+            <a:picLocks noChangeAspect="1"/>
+          </p:cNvPicPr>
+          <p:nvPr/>
+        </p:nvPicPr>
+        <p:blipFill>
+          <a:blip r:embed="rId2">
+            <a:extLst>
+              <a:ext uri="{96DAC541-7B7A-43D3-8B79-37D633B846F1}">
+                <asvg:svgBlip xmlns:asvg="http://schemas.microsoft.com/office/drawing/2016/SVG/main" r:embed="rId3"/>
+              </a:ext>
+            </a:extLst>
+          </a:blip>
+          <a:stretch>
+            <a:fillRect/>
+          </a:stretch>
+        </p:blipFill>
+        <p:spPr>
+          <a:xfrm>
+            <a:off x="991752" y="4789881"/>
+            <a:ext cx="388572" cy="388572"/>
+          </a:xfrm>
+          <a:prstGeom prst="rect">
+            <a:avLst/>
+          </a:prstGeom>
+        </p:spPr>
+      </p:pic>
+      <p:sp>
+        <p:nvSpPr>
+          <p:cNvPr id="20" name="Téglalap 19">
+            <a:extLst>
+              <a:ext uri="{FF2B5EF4-FFF2-40B4-BE49-F238E27FC236}">
+                <a16:creationId xmlns:a16="http://schemas.microsoft.com/office/drawing/2014/main" id="{09B119C1-848B-AE3C-0F5F-C1E6D6326147}"/>
+              </a:ext>
+            </a:extLst>
+          </p:cNvPr>
+          <p:cNvSpPr/>
+          <p:nvPr/>
+        </p:nvSpPr>
+        <p:spPr>
+          <a:xfrm>
+            <a:off x="648970" y="2943826"/>
+            <a:ext cx="4160520" cy="80654"/>
+          </a:xfrm>
+          <a:prstGeom prst="rect">
+            <a:avLst/>
+          </a:prstGeom>
+          <a:solidFill>
+            <a:srgbClr val="FFC000"/>
+          </a:solidFill>
+          <a:ln>
+            <a:noFill/>
+          </a:ln>
+        </p:spPr>
+        <p:style>
+          <a:lnRef idx="2">
+            <a:schemeClr val="accent1">
+              <a:shade val="15000"/>
+            </a:schemeClr>
+          </a:lnRef>
+          <a:fillRef idx="1">
+            <a:schemeClr val="accent1"/>
+          </a:fillRef>
+          <a:effectRef idx="0">
+            <a:schemeClr val="accent1"/>
+          </a:effectRef>
+          <a:fontRef idx="minor">
+            <a:schemeClr val="lt1"/>
+          </a:fontRef>
+        </p:style>
+        <p:txBody>
+          <a:bodyPr rtlCol="0" anchor="ctr"/>
+          <a:lstStyle/>
+          <a:p>
+            <a:pPr algn="ctr"/>
+            <a:endParaRPr lang="en-GB"/>
+          </a:p>
+        </p:txBody>
+      </p:sp>
     </p:spTree>
     <p:extLst>
       <p:ext uri="{BB962C8B-B14F-4D97-AF65-F5344CB8AC3E}">

</xml_diff>

<commit_message>
move songs page files
</commit_message>
<xml_diff>
--- a/Tervek/ui-terv.pptx
+++ b/Tervek/ui-terv.pptx
@@ -26,6 +26,7 @@
     <p:sldId id="274" r:id="rId20"/>
     <p:sldId id="276" r:id="rId21"/>
     <p:sldId id="275" r:id="rId22"/>
+    <p:sldId id="279" r:id="rId23"/>
   </p:sldIdLst>
   <p:sldSz cx="6858000" cy="9144000" type="screen4x3"/>
   <p:notesSz cx="6858000" cy="9144000"/>
@@ -168,6 +169,11 @@
             <p14:sldId id="275"/>
           </p14:sldIdLst>
         </p14:section>
+        <p14:section name="Daltár kezelés" id="{EC1C798E-FB84-4ABE-8C36-3870264BF291}">
+          <p14:sldIdLst>
+            <p14:sldId id="279"/>
+          </p14:sldIdLst>
+        </p14:section>
       </p14:sectionLst>
     </p:ext>
     <p:ext uri="{EFAFB233-063F-42B5-8137-9DF3F51BA10A}">
@@ -308,7 +314,7 @@
           <a:p>
             <a:fld id="{4EA07C61-72C1-4B0F-B28F-4EAAE2D57413}" type="datetimeFigureOut">
               <a:rPr lang="en-GB" smtClean="0"/>
-              <a:t>2025-03-07</a:t>
+              <a:t>2025-05-30</a:t>
             </a:fld>
             <a:endParaRPr lang="en-GB"/>
           </a:p>
@@ -478,7 +484,7 @@
           <a:p>
             <a:fld id="{4EA07C61-72C1-4B0F-B28F-4EAAE2D57413}" type="datetimeFigureOut">
               <a:rPr lang="en-GB" smtClean="0"/>
-              <a:t>2025-03-07</a:t>
+              <a:t>2025-05-30</a:t>
             </a:fld>
             <a:endParaRPr lang="en-GB"/>
           </a:p>
@@ -658,7 +664,7 @@
           <a:p>
             <a:fld id="{4EA07C61-72C1-4B0F-B28F-4EAAE2D57413}" type="datetimeFigureOut">
               <a:rPr lang="en-GB" smtClean="0"/>
-              <a:t>2025-03-07</a:t>
+              <a:t>2025-05-30</a:t>
             </a:fld>
             <a:endParaRPr lang="en-GB"/>
           </a:p>
@@ -828,7 +834,7 @@
           <a:p>
             <a:fld id="{4EA07C61-72C1-4B0F-B28F-4EAAE2D57413}" type="datetimeFigureOut">
               <a:rPr lang="en-GB" smtClean="0"/>
-              <a:t>2025-03-07</a:t>
+              <a:t>2025-05-30</a:t>
             </a:fld>
             <a:endParaRPr lang="en-GB"/>
           </a:p>
@@ -1074,7 +1080,7 @@
           <a:p>
             <a:fld id="{4EA07C61-72C1-4B0F-B28F-4EAAE2D57413}" type="datetimeFigureOut">
               <a:rPr lang="en-GB" smtClean="0"/>
-              <a:t>2025-03-07</a:t>
+              <a:t>2025-05-30</a:t>
             </a:fld>
             <a:endParaRPr lang="en-GB"/>
           </a:p>
@@ -1306,7 +1312,7 @@
           <a:p>
             <a:fld id="{4EA07C61-72C1-4B0F-B28F-4EAAE2D57413}" type="datetimeFigureOut">
               <a:rPr lang="en-GB" smtClean="0"/>
-              <a:t>2025-03-07</a:t>
+              <a:t>2025-05-30</a:t>
             </a:fld>
             <a:endParaRPr lang="en-GB"/>
           </a:p>
@@ -1673,7 +1679,7 @@
           <a:p>
             <a:fld id="{4EA07C61-72C1-4B0F-B28F-4EAAE2D57413}" type="datetimeFigureOut">
               <a:rPr lang="en-GB" smtClean="0"/>
-              <a:t>2025-03-07</a:t>
+              <a:t>2025-05-30</a:t>
             </a:fld>
             <a:endParaRPr lang="en-GB"/>
           </a:p>
@@ -1791,7 +1797,7 @@
           <a:p>
             <a:fld id="{4EA07C61-72C1-4B0F-B28F-4EAAE2D57413}" type="datetimeFigureOut">
               <a:rPr lang="en-GB" smtClean="0"/>
-              <a:t>2025-03-07</a:t>
+              <a:t>2025-05-30</a:t>
             </a:fld>
             <a:endParaRPr lang="en-GB"/>
           </a:p>
@@ -1886,7 +1892,7 @@
           <a:p>
             <a:fld id="{4EA07C61-72C1-4B0F-B28F-4EAAE2D57413}" type="datetimeFigureOut">
               <a:rPr lang="en-GB" smtClean="0"/>
-              <a:t>2025-03-07</a:t>
+              <a:t>2025-05-30</a:t>
             </a:fld>
             <a:endParaRPr lang="en-GB"/>
           </a:p>
@@ -2163,7 +2169,7 @@
           <a:p>
             <a:fld id="{4EA07C61-72C1-4B0F-B28F-4EAAE2D57413}" type="datetimeFigureOut">
               <a:rPr lang="en-GB" smtClean="0"/>
-              <a:t>2025-03-07</a:t>
+              <a:t>2025-05-30</a:t>
             </a:fld>
             <a:endParaRPr lang="en-GB"/>
           </a:p>
@@ -2420,7 +2426,7 @@
           <a:p>
             <a:fld id="{4EA07C61-72C1-4B0F-B28F-4EAAE2D57413}" type="datetimeFigureOut">
               <a:rPr lang="en-GB" smtClean="0"/>
-              <a:t>2025-03-07</a:t>
+              <a:t>2025-05-30</a:t>
             </a:fld>
             <a:endParaRPr lang="en-GB"/>
           </a:p>
@@ -2636,7 +2642,7 @@
           <a:p>
             <a:fld id="{4EA07C61-72C1-4B0F-B28F-4EAAE2D57413}" type="datetimeFigureOut">
               <a:rPr lang="en-GB" smtClean="0"/>
-              <a:t>2025-03-07</a:t>
+              <a:t>2025-05-30</a:t>
             </a:fld>
             <a:endParaRPr lang="en-GB"/>
           </a:p>
@@ -18744,6 +18750,1104 @@
     <p:extLst>
       <p:ext uri="{BB962C8B-B14F-4D97-AF65-F5344CB8AC3E}">
         <p14:creationId xmlns:p14="http://schemas.microsoft.com/office/powerpoint/2010/main" val="3906601896"/>
+      </p:ext>
+    </p:extLst>
+  </p:cSld>
+  <p:clrMapOvr>
+    <a:masterClrMapping/>
+  </p:clrMapOvr>
+</p:sld>
+</file>
+
+<file path=ppt/slides/slide22.xml><?xml version="1.0" encoding="utf-8"?>
+<p:sld xmlns:a="http://schemas.openxmlformats.org/drawingml/2006/main" xmlns:r="http://schemas.openxmlformats.org/officeDocument/2006/relationships" xmlns:p="http://schemas.openxmlformats.org/presentationml/2006/main">
+  <p:cSld>
+    <p:bg>
+      <p:bgPr>
+        <a:solidFill>
+          <a:schemeClr val="bg1">
+            <a:lumMod val="95000"/>
+          </a:schemeClr>
+        </a:solidFill>
+        <a:effectLst/>
+      </p:bgPr>
+    </p:bg>
+    <p:spTree>
+      <p:nvGrpSpPr>
+        <p:cNvPr id="1" name=""/>
+        <p:cNvGrpSpPr/>
+        <p:nvPr/>
+      </p:nvGrpSpPr>
+      <p:grpSpPr>
+        <a:xfrm>
+          <a:off x="0" y="0"/>
+          <a:ext cx="0" cy="0"/>
+          <a:chOff x="0" y="0"/>
+          <a:chExt cx="0" cy="0"/>
+        </a:xfrm>
+      </p:grpSpPr>
+      <p:sp>
+        <p:nvSpPr>
+          <p:cNvPr id="8" name="Téglalap 7">
+            <a:extLst>
+              <a:ext uri="{FF2B5EF4-FFF2-40B4-BE49-F238E27FC236}">
+                <a16:creationId xmlns:a16="http://schemas.microsoft.com/office/drawing/2014/main" id="{49C500B0-D2EC-BA23-6AD6-EAA1E9FED5E9}"/>
+              </a:ext>
+            </a:extLst>
+          </p:cNvPr>
+          <p:cNvSpPr>
+            <a:spLocks noGrp="1" noRot="1" noMove="1" noResize="1" noEditPoints="1" noAdjustHandles="1" noChangeArrowheads="1" noChangeShapeType="1"/>
+          </p:cNvSpPr>
+          <p:nvPr/>
+        </p:nvSpPr>
+        <p:spPr>
+          <a:xfrm>
+            <a:off x="4953000" y="0"/>
+            <a:ext cx="1905000" cy="9144000"/>
+          </a:xfrm>
+          <a:prstGeom prst="rect">
+            <a:avLst/>
+          </a:prstGeom>
+        </p:spPr>
+        <p:style>
+          <a:lnRef idx="2">
+            <a:schemeClr val="dk1">
+              <a:shade val="15000"/>
+            </a:schemeClr>
+          </a:lnRef>
+          <a:fillRef idx="1">
+            <a:schemeClr val="dk1"/>
+          </a:fillRef>
+          <a:effectRef idx="0">
+            <a:schemeClr val="dk1"/>
+          </a:effectRef>
+          <a:fontRef idx="minor">
+            <a:schemeClr val="lt1"/>
+          </a:fontRef>
+        </p:style>
+        <p:txBody>
+          <a:bodyPr rtlCol="0" anchor="ctr"/>
+          <a:lstStyle/>
+          <a:p>
+            <a:pPr algn="ctr"/>
+            <a:endParaRPr lang="hu-HU"/>
+          </a:p>
+        </p:txBody>
+      </p:sp>
+      <p:pic>
+        <p:nvPicPr>
+          <p:cNvPr id="5" name="Kép 4">
+            <a:extLst>
+              <a:ext uri="{FF2B5EF4-FFF2-40B4-BE49-F238E27FC236}">
+                <a16:creationId xmlns:a16="http://schemas.microsoft.com/office/drawing/2014/main" id="{9CD317C4-5CE4-9FB1-3C95-AEC45F77D6A2}"/>
+              </a:ext>
+            </a:extLst>
+          </p:cNvPr>
+          <p:cNvPicPr>
+            <a:picLocks noChangeAspect="1"/>
+          </p:cNvPicPr>
+          <p:nvPr/>
+        </p:nvPicPr>
+        <p:blipFill>
+          <a:blip r:embed="rId2"/>
+          <a:srcRect t="4396"/>
+          <a:stretch/>
+        </p:blipFill>
+        <p:spPr>
+          <a:xfrm>
+            <a:off x="0" y="8458764"/>
+            <a:ext cx="4953000" cy="685236"/>
+          </a:xfrm>
+          <a:prstGeom prst="rect">
+            <a:avLst/>
+          </a:prstGeom>
+        </p:spPr>
+      </p:pic>
+      <p:pic>
+        <p:nvPicPr>
+          <p:cNvPr id="7" name="Kép 6">
+            <a:extLst>
+              <a:ext uri="{FF2B5EF4-FFF2-40B4-BE49-F238E27FC236}">
+                <a16:creationId xmlns:a16="http://schemas.microsoft.com/office/drawing/2014/main" id="{81EEDD65-82E7-BC4A-43B8-ABCA596951B0}"/>
+              </a:ext>
+            </a:extLst>
+          </p:cNvPr>
+          <p:cNvPicPr>
+            <a:picLocks noChangeAspect="1"/>
+          </p:cNvPicPr>
+          <p:nvPr/>
+        </p:nvPicPr>
+        <p:blipFill>
+          <a:blip r:embed="rId3"/>
+          <a:stretch>
+            <a:fillRect/>
+          </a:stretch>
+        </p:blipFill>
+        <p:spPr>
+          <a:xfrm>
+            <a:off x="-1" y="0"/>
+            <a:ext cx="4919701" cy="4887686"/>
+          </a:xfrm>
+          <a:prstGeom prst="rect">
+            <a:avLst/>
+          </a:prstGeom>
+        </p:spPr>
+      </p:pic>
+      <p:sp>
+        <p:nvSpPr>
+          <p:cNvPr id="9" name="Szövegdoboz 8">
+            <a:extLst>
+              <a:ext uri="{FF2B5EF4-FFF2-40B4-BE49-F238E27FC236}">
+                <a16:creationId xmlns:a16="http://schemas.microsoft.com/office/drawing/2014/main" id="{86AD760E-61EF-90C0-C919-71782751D9C8}"/>
+              </a:ext>
+            </a:extLst>
+          </p:cNvPr>
+          <p:cNvSpPr txBox="1"/>
+          <p:nvPr/>
+        </p:nvSpPr>
+        <p:spPr>
+          <a:xfrm>
+            <a:off x="57149" y="4974772"/>
+            <a:ext cx="1151149" cy="338554"/>
+          </a:xfrm>
+          <a:prstGeom prst="rect">
+            <a:avLst/>
+          </a:prstGeom>
+          <a:noFill/>
+        </p:spPr>
+        <p:txBody>
+          <a:bodyPr wrap="none" rtlCol="0">
+            <a:spAutoFit/>
+          </a:bodyPr>
+          <a:lstStyle/>
+          <a:p>
+            <a:r>
+              <a:rPr lang="en-GB" sz="1600" b="1" dirty="0"/>
+              <a:t>DALTÁRAK</a:t>
+            </a:r>
+            <a:endParaRPr lang="hu-HU" sz="1600" b="1" dirty="0"/>
+          </a:p>
+        </p:txBody>
+      </p:sp>
+      <p:sp>
+        <p:nvSpPr>
+          <p:cNvPr id="10" name="Téglalap: lekerekített 9">
+            <a:extLst>
+              <a:ext uri="{FF2B5EF4-FFF2-40B4-BE49-F238E27FC236}">
+                <a16:creationId xmlns:a16="http://schemas.microsoft.com/office/drawing/2014/main" id="{1EBC2897-D079-6739-55C1-CD7CC17709EB}"/>
+              </a:ext>
+            </a:extLst>
+          </p:cNvPr>
+          <p:cNvSpPr/>
+          <p:nvPr/>
+        </p:nvSpPr>
+        <p:spPr>
+          <a:xfrm>
+            <a:off x="150346" y="5400412"/>
+            <a:ext cx="4595826" cy="793560"/>
+          </a:xfrm>
+          <a:prstGeom prst="roundRect">
+            <a:avLst/>
+          </a:prstGeom>
+          <a:solidFill>
+            <a:schemeClr val="bg1">
+              <a:lumMod val="85000"/>
+            </a:schemeClr>
+          </a:solidFill>
+          <a:ln>
+            <a:noFill/>
+          </a:ln>
+          <a:effectLst>
+            <a:outerShdw blurRad="165100" dir="5400000" algn="t" rotWithShape="0">
+              <a:prstClr val="black">
+                <a:alpha val="10000"/>
+              </a:prstClr>
+            </a:outerShdw>
+          </a:effectLst>
+        </p:spPr>
+        <p:style>
+          <a:lnRef idx="2">
+            <a:schemeClr val="accent1">
+              <a:shade val="15000"/>
+            </a:schemeClr>
+          </a:lnRef>
+          <a:fillRef idx="1">
+            <a:schemeClr val="accent1"/>
+          </a:fillRef>
+          <a:effectRef idx="0">
+            <a:schemeClr val="accent1"/>
+          </a:effectRef>
+          <a:fontRef idx="minor">
+            <a:schemeClr val="lt1"/>
+          </a:fontRef>
+        </p:style>
+        <p:txBody>
+          <a:bodyPr rtlCol="0" anchor="ctr"/>
+          <a:lstStyle/>
+          <a:p>
+            <a:pPr algn="ctr"/>
+            <a:endParaRPr lang="hu-HU"/>
+          </a:p>
+        </p:txBody>
+      </p:sp>
+      <p:sp>
+        <p:nvSpPr>
+          <p:cNvPr id="11" name="Téglalap: lekerekített 10">
+            <a:extLst>
+              <a:ext uri="{FF2B5EF4-FFF2-40B4-BE49-F238E27FC236}">
+                <a16:creationId xmlns:a16="http://schemas.microsoft.com/office/drawing/2014/main" id="{74EEA802-86F9-607A-078F-8E6B011522C6}"/>
+              </a:ext>
+            </a:extLst>
+          </p:cNvPr>
+          <p:cNvSpPr/>
+          <p:nvPr/>
+        </p:nvSpPr>
+        <p:spPr>
+          <a:xfrm>
+            <a:off x="150346" y="6363530"/>
+            <a:ext cx="4595826" cy="793560"/>
+          </a:xfrm>
+          <a:prstGeom prst="roundRect">
+            <a:avLst/>
+          </a:prstGeom>
+          <a:solidFill>
+            <a:schemeClr val="bg1">
+              <a:lumMod val="85000"/>
+            </a:schemeClr>
+          </a:solidFill>
+          <a:ln>
+            <a:noFill/>
+          </a:ln>
+          <a:effectLst>
+            <a:outerShdw blurRad="165100" dir="5400000" algn="t" rotWithShape="0">
+              <a:prstClr val="black">
+                <a:alpha val="10000"/>
+              </a:prstClr>
+            </a:outerShdw>
+          </a:effectLst>
+        </p:spPr>
+        <p:style>
+          <a:lnRef idx="2">
+            <a:schemeClr val="accent1">
+              <a:shade val="15000"/>
+            </a:schemeClr>
+          </a:lnRef>
+          <a:fillRef idx="1">
+            <a:schemeClr val="accent1"/>
+          </a:fillRef>
+          <a:effectRef idx="0">
+            <a:schemeClr val="accent1"/>
+          </a:effectRef>
+          <a:fontRef idx="minor">
+            <a:schemeClr val="lt1"/>
+          </a:fontRef>
+        </p:style>
+        <p:txBody>
+          <a:bodyPr rtlCol="0" anchor="ctr"/>
+          <a:lstStyle/>
+          <a:p>
+            <a:pPr algn="ctr"/>
+            <a:endParaRPr lang="hu-HU" dirty="0"/>
+          </a:p>
+        </p:txBody>
+      </p:sp>
+      <p:pic>
+        <p:nvPicPr>
+          <p:cNvPr id="14" name="Kép 13" descr="A képen Betűtípus, embléma, szimbólum, Grafika látható&#10;&#10;Előfordulhat, hogy a mesterséges intelligencia által létrehozott tartalom helytelen.">
+            <a:extLst>
+              <a:ext uri="{FF2B5EF4-FFF2-40B4-BE49-F238E27FC236}">
+                <a16:creationId xmlns:a16="http://schemas.microsoft.com/office/drawing/2014/main" id="{4EA80B6E-2475-5CB3-3068-856A829A2B63}"/>
+              </a:ext>
+            </a:extLst>
+          </p:cNvPr>
+          <p:cNvPicPr>
+            <a:picLocks noChangeAspect="1"/>
+          </p:cNvPicPr>
+          <p:nvPr/>
+        </p:nvPicPr>
+        <p:blipFill>
+          <a:blip r:embed="rId4">
+            <a:extLst>
+              <a:ext uri="{28A0092B-C50C-407E-A947-70E740481C1C}">
+                <a14:useLocalDpi xmlns:a14="http://schemas.microsoft.com/office/drawing/2010/main" val="0"/>
+              </a:ext>
+            </a:extLst>
+          </a:blip>
+          <a:stretch>
+            <a:fillRect/>
+          </a:stretch>
+        </p:blipFill>
+        <p:spPr>
+          <a:xfrm>
+            <a:off x="222118" y="5448017"/>
+            <a:ext cx="706910" cy="706910"/>
+          </a:xfrm>
+          <a:prstGeom prst="rect">
+            <a:avLst/>
+          </a:prstGeom>
+        </p:spPr>
+      </p:pic>
+      <p:sp>
+        <p:nvSpPr>
+          <p:cNvPr id="17" name="Szövegdoboz 16">
+            <a:extLst>
+              <a:ext uri="{FF2B5EF4-FFF2-40B4-BE49-F238E27FC236}">
+                <a16:creationId xmlns:a16="http://schemas.microsoft.com/office/drawing/2014/main" id="{A0B2ADAE-B90F-9439-68F9-0BC983EF87A0}"/>
+              </a:ext>
+            </a:extLst>
+          </p:cNvPr>
+          <p:cNvSpPr txBox="1"/>
+          <p:nvPr/>
+        </p:nvSpPr>
+        <p:spPr>
+          <a:xfrm>
+            <a:off x="1000800" y="5495584"/>
+            <a:ext cx="1552284" cy="369332"/>
+          </a:xfrm>
+          <a:prstGeom prst="rect">
+            <a:avLst/>
+          </a:prstGeom>
+          <a:noFill/>
+        </p:spPr>
+        <p:txBody>
+          <a:bodyPr wrap="none" rtlCol="0">
+            <a:spAutoFit/>
+          </a:bodyPr>
+          <a:lstStyle/>
+          <a:p>
+            <a:r>
+              <a:rPr lang="en-GB" dirty="0"/>
+              <a:t>Sófár </a:t>
+            </a:r>
+            <a:r>
+              <a:rPr lang="en-GB" dirty="0" err="1"/>
+              <a:t>Kottatár</a:t>
+            </a:r>
+            <a:endParaRPr lang="hu-HU" dirty="0"/>
+          </a:p>
+        </p:txBody>
+      </p:sp>
+      <p:sp>
+        <p:nvSpPr>
+          <p:cNvPr id="18" name="Szövegdoboz 17">
+            <a:extLst>
+              <a:ext uri="{FF2B5EF4-FFF2-40B4-BE49-F238E27FC236}">
+                <a16:creationId xmlns:a16="http://schemas.microsoft.com/office/drawing/2014/main" id="{8A0DED70-9B2B-E40C-3437-6931F2FD4988}"/>
+              </a:ext>
+            </a:extLst>
+          </p:cNvPr>
+          <p:cNvSpPr txBox="1"/>
+          <p:nvPr/>
+        </p:nvSpPr>
+        <p:spPr>
+          <a:xfrm>
+            <a:off x="991998" y="5780799"/>
+            <a:ext cx="753732" cy="307777"/>
+          </a:xfrm>
+          <a:prstGeom prst="rect">
+            <a:avLst/>
+          </a:prstGeom>
+          <a:noFill/>
+        </p:spPr>
+        <p:txBody>
+          <a:bodyPr wrap="none" rtlCol="0">
+            <a:spAutoFit/>
+          </a:bodyPr>
+          <a:lstStyle/>
+          <a:p>
+            <a:r>
+              <a:rPr lang="en-GB" sz="1400" dirty="0"/>
+              <a:t>280 dal</a:t>
+            </a:r>
+            <a:endParaRPr lang="hu-HU" sz="1400" dirty="0"/>
+          </a:p>
+        </p:txBody>
+      </p:sp>
+      <p:sp>
+        <p:nvSpPr>
+          <p:cNvPr id="21" name="Nyíl: jobbra mutató 20">
+            <a:extLst>
+              <a:ext uri="{FF2B5EF4-FFF2-40B4-BE49-F238E27FC236}">
+                <a16:creationId xmlns:a16="http://schemas.microsoft.com/office/drawing/2014/main" id="{CB27A13F-938C-FA07-FD2A-01B96D0472C0}"/>
+              </a:ext>
+            </a:extLst>
+          </p:cNvPr>
+          <p:cNvSpPr/>
+          <p:nvPr/>
+        </p:nvSpPr>
+        <p:spPr>
+          <a:xfrm>
+            <a:off x="4304918" y="5689929"/>
+            <a:ext cx="252296" cy="223086"/>
+          </a:xfrm>
+          <a:prstGeom prst="rightArrow">
+            <a:avLst>
+              <a:gd name="adj1" fmla="val 19558"/>
+              <a:gd name="adj2" fmla="val 43081"/>
+            </a:avLst>
+          </a:prstGeom>
+          <a:solidFill>
+            <a:schemeClr val="tx1">
+              <a:lumMod val="65000"/>
+              <a:lumOff val="35000"/>
+            </a:schemeClr>
+          </a:solidFill>
+          <a:ln>
+            <a:noFill/>
+          </a:ln>
+        </p:spPr>
+        <p:style>
+          <a:lnRef idx="2">
+            <a:schemeClr val="accent1">
+              <a:shade val="15000"/>
+            </a:schemeClr>
+          </a:lnRef>
+          <a:fillRef idx="1">
+            <a:schemeClr val="accent1"/>
+          </a:fillRef>
+          <a:effectRef idx="0">
+            <a:schemeClr val="accent1"/>
+          </a:effectRef>
+          <a:fontRef idx="minor">
+            <a:schemeClr val="lt1"/>
+          </a:fontRef>
+        </p:style>
+        <p:txBody>
+          <a:bodyPr rtlCol="0" anchor="ctr"/>
+          <a:lstStyle/>
+          <a:p>
+            <a:pPr algn="ctr"/>
+            <a:endParaRPr lang="hu-HU"/>
+          </a:p>
+        </p:txBody>
+      </p:sp>
+      <p:sp>
+        <p:nvSpPr>
+          <p:cNvPr id="22" name="Nyíl: jobbra mutató 21">
+            <a:extLst>
+              <a:ext uri="{FF2B5EF4-FFF2-40B4-BE49-F238E27FC236}">
+                <a16:creationId xmlns:a16="http://schemas.microsoft.com/office/drawing/2014/main" id="{12C5F34D-7774-D4E1-E855-C5C14B88D4EB}"/>
+              </a:ext>
+            </a:extLst>
+          </p:cNvPr>
+          <p:cNvSpPr/>
+          <p:nvPr/>
+        </p:nvSpPr>
+        <p:spPr>
+          <a:xfrm>
+            <a:off x="4304918" y="6648767"/>
+            <a:ext cx="252296" cy="223086"/>
+          </a:xfrm>
+          <a:prstGeom prst="rightArrow">
+            <a:avLst>
+              <a:gd name="adj1" fmla="val 19558"/>
+              <a:gd name="adj2" fmla="val 43081"/>
+            </a:avLst>
+          </a:prstGeom>
+          <a:solidFill>
+            <a:schemeClr val="tx1">
+              <a:lumMod val="65000"/>
+              <a:lumOff val="35000"/>
+            </a:schemeClr>
+          </a:solidFill>
+          <a:ln>
+            <a:noFill/>
+          </a:ln>
+        </p:spPr>
+        <p:style>
+          <a:lnRef idx="2">
+            <a:schemeClr val="accent1">
+              <a:shade val="15000"/>
+            </a:schemeClr>
+          </a:lnRef>
+          <a:fillRef idx="1">
+            <a:schemeClr val="accent1"/>
+          </a:fillRef>
+          <a:effectRef idx="0">
+            <a:schemeClr val="accent1"/>
+          </a:effectRef>
+          <a:fontRef idx="minor">
+            <a:schemeClr val="lt1"/>
+          </a:fontRef>
+        </p:style>
+        <p:txBody>
+          <a:bodyPr rtlCol="0" anchor="ctr"/>
+          <a:lstStyle/>
+          <a:p>
+            <a:pPr algn="ctr"/>
+            <a:endParaRPr lang="hu-HU"/>
+          </a:p>
+        </p:txBody>
+      </p:sp>
+      <p:sp>
+        <p:nvSpPr>
+          <p:cNvPr id="23" name="Téglalap: lekerekített 22">
+            <a:extLst>
+              <a:ext uri="{FF2B5EF4-FFF2-40B4-BE49-F238E27FC236}">
+                <a16:creationId xmlns:a16="http://schemas.microsoft.com/office/drawing/2014/main" id="{5D76233B-58A7-DA24-62FA-641143F0E7B4}"/>
+              </a:ext>
+            </a:extLst>
+          </p:cNvPr>
+          <p:cNvSpPr/>
+          <p:nvPr/>
+        </p:nvSpPr>
+        <p:spPr>
+          <a:xfrm>
+            <a:off x="150346" y="7320220"/>
+            <a:ext cx="4595826" cy="793560"/>
+          </a:xfrm>
+          <a:prstGeom prst="roundRect">
+            <a:avLst/>
+          </a:prstGeom>
+          <a:solidFill>
+            <a:schemeClr val="bg1">
+              <a:lumMod val="85000"/>
+            </a:schemeClr>
+          </a:solidFill>
+          <a:ln>
+            <a:noFill/>
+          </a:ln>
+          <a:effectLst>
+            <a:outerShdw blurRad="165100" dir="5400000" algn="t" rotWithShape="0">
+              <a:prstClr val="black">
+                <a:alpha val="10000"/>
+              </a:prstClr>
+            </a:outerShdw>
+          </a:effectLst>
+        </p:spPr>
+        <p:style>
+          <a:lnRef idx="2">
+            <a:schemeClr val="accent1">
+              <a:shade val="15000"/>
+            </a:schemeClr>
+          </a:lnRef>
+          <a:fillRef idx="1">
+            <a:schemeClr val="accent1"/>
+          </a:fillRef>
+          <a:effectRef idx="0">
+            <a:schemeClr val="accent1"/>
+          </a:effectRef>
+          <a:fontRef idx="minor">
+            <a:schemeClr val="lt1"/>
+          </a:fontRef>
+        </p:style>
+        <p:txBody>
+          <a:bodyPr rtlCol="0" anchor="ctr"/>
+          <a:lstStyle/>
+          <a:p>
+            <a:pPr algn="ctr"/>
+            <a:endParaRPr lang="hu-HU"/>
+          </a:p>
+        </p:txBody>
+      </p:sp>
+      <p:sp>
+        <p:nvSpPr>
+          <p:cNvPr id="26" name="Téglalap 25">
+            <a:extLst>
+              <a:ext uri="{FF2B5EF4-FFF2-40B4-BE49-F238E27FC236}">
+                <a16:creationId xmlns:a16="http://schemas.microsoft.com/office/drawing/2014/main" id="{9AE61AA6-7F34-F556-F27F-63DEC8A1DDF3}"/>
+              </a:ext>
+            </a:extLst>
+          </p:cNvPr>
+          <p:cNvSpPr/>
+          <p:nvPr/>
+        </p:nvSpPr>
+        <p:spPr>
+          <a:xfrm>
+            <a:off x="0" y="7899400"/>
+            <a:ext cx="4953000" cy="559364"/>
+          </a:xfrm>
+          <a:prstGeom prst="rect">
+            <a:avLst/>
+          </a:prstGeom>
+          <a:solidFill>
+            <a:schemeClr val="bg1">
+              <a:lumMod val="95000"/>
+            </a:schemeClr>
+          </a:solidFill>
+          <a:ln>
+            <a:noFill/>
+          </a:ln>
+          <a:effectLst>
+            <a:softEdge rad="63500"/>
+          </a:effectLst>
+        </p:spPr>
+        <p:style>
+          <a:lnRef idx="2">
+            <a:schemeClr val="accent1">
+              <a:shade val="15000"/>
+            </a:schemeClr>
+          </a:lnRef>
+          <a:fillRef idx="1">
+            <a:schemeClr val="accent1"/>
+          </a:fillRef>
+          <a:effectRef idx="0">
+            <a:schemeClr val="accent1"/>
+          </a:effectRef>
+          <a:fontRef idx="minor">
+            <a:schemeClr val="lt1"/>
+          </a:fontRef>
+        </p:style>
+        <p:txBody>
+          <a:bodyPr rtlCol="0" anchor="ctr"/>
+          <a:lstStyle/>
+          <a:p>
+            <a:pPr algn="ctr"/>
+            <a:endParaRPr lang="hu-HU"/>
+          </a:p>
+        </p:txBody>
+      </p:sp>
+      <p:sp>
+        <p:nvSpPr>
+          <p:cNvPr id="19" name="Szövegdoboz 18">
+            <a:extLst>
+              <a:ext uri="{FF2B5EF4-FFF2-40B4-BE49-F238E27FC236}">
+                <a16:creationId xmlns:a16="http://schemas.microsoft.com/office/drawing/2014/main" id="{707040CC-4E04-94EC-C34C-B8967C22606D}"/>
+              </a:ext>
+            </a:extLst>
+          </p:cNvPr>
+          <p:cNvSpPr txBox="1"/>
+          <p:nvPr/>
+        </p:nvSpPr>
+        <p:spPr>
+          <a:xfrm>
+            <a:off x="2614630" y="8033864"/>
+            <a:ext cx="1683987" cy="338554"/>
+          </a:xfrm>
+          <a:prstGeom prst="rect">
+            <a:avLst/>
+          </a:prstGeom>
+          <a:noFill/>
+        </p:spPr>
+        <p:txBody>
+          <a:bodyPr wrap="none" rtlCol="0">
+            <a:spAutoFit/>
+          </a:bodyPr>
+          <a:lstStyle/>
+          <a:p>
+            <a:pPr algn="r"/>
+            <a:r>
+              <a:rPr lang="en-GB" sz="1600" b="1" dirty="0" err="1"/>
+              <a:t>Összes</a:t>
+            </a:r>
+            <a:r>
+              <a:rPr lang="en-GB" sz="1600" b="1" dirty="0"/>
+              <a:t> (750) dal</a:t>
+            </a:r>
+            <a:endParaRPr lang="hu-HU" sz="1600" b="1" dirty="0"/>
+          </a:p>
+        </p:txBody>
+      </p:sp>
+      <p:sp>
+        <p:nvSpPr>
+          <p:cNvPr id="20" name="Nyíl: jobbra mutató 19">
+            <a:extLst>
+              <a:ext uri="{FF2B5EF4-FFF2-40B4-BE49-F238E27FC236}">
+                <a16:creationId xmlns:a16="http://schemas.microsoft.com/office/drawing/2014/main" id="{3B01BA0C-9DFD-65D5-8D03-5EE12FD933BB}"/>
+              </a:ext>
+            </a:extLst>
+          </p:cNvPr>
+          <p:cNvSpPr/>
+          <p:nvPr/>
+        </p:nvSpPr>
+        <p:spPr>
+          <a:xfrm>
+            <a:off x="4293342" y="8091598"/>
+            <a:ext cx="252296" cy="223086"/>
+          </a:xfrm>
+          <a:prstGeom prst="rightArrow">
+            <a:avLst>
+              <a:gd name="adj1" fmla="val 19558"/>
+              <a:gd name="adj2" fmla="val 43081"/>
+            </a:avLst>
+          </a:prstGeom>
+          <a:solidFill>
+            <a:schemeClr val="tx1">
+              <a:lumMod val="65000"/>
+              <a:lumOff val="35000"/>
+            </a:schemeClr>
+          </a:solidFill>
+          <a:ln>
+            <a:noFill/>
+          </a:ln>
+        </p:spPr>
+        <p:style>
+          <a:lnRef idx="2">
+            <a:schemeClr val="accent1">
+              <a:shade val="15000"/>
+            </a:schemeClr>
+          </a:lnRef>
+          <a:fillRef idx="1">
+            <a:schemeClr val="accent1"/>
+          </a:fillRef>
+          <a:effectRef idx="0">
+            <a:schemeClr val="accent1"/>
+          </a:effectRef>
+          <a:fontRef idx="minor">
+            <a:schemeClr val="lt1"/>
+          </a:fontRef>
+        </p:style>
+        <p:txBody>
+          <a:bodyPr rtlCol="0" anchor="ctr"/>
+          <a:lstStyle/>
+          <a:p>
+            <a:pPr algn="ctr"/>
+            <a:endParaRPr lang="hu-HU"/>
+          </a:p>
+        </p:txBody>
+      </p:sp>
+      <p:pic>
+        <p:nvPicPr>
+          <p:cNvPr id="30" name="Ábra 29">
+            <a:extLst>
+              <a:ext uri="{FF2B5EF4-FFF2-40B4-BE49-F238E27FC236}">
+                <a16:creationId xmlns:a16="http://schemas.microsoft.com/office/drawing/2014/main" id="{B6C93D2B-7994-88AC-AFC5-1E4695A5F63E}"/>
+              </a:ext>
+            </a:extLst>
+          </p:cNvPr>
+          <p:cNvPicPr>
+            <a:picLocks noChangeAspect="1"/>
+          </p:cNvPicPr>
+          <p:nvPr/>
+        </p:nvPicPr>
+        <p:blipFill>
+          <a:blip r:embed="rId5">
+            <a:extLst>
+              <a:ext uri="{96DAC541-7B7A-43D3-8B79-37D633B846F1}">
+                <asvg:svgBlip xmlns:asvg="http://schemas.microsoft.com/office/drawing/2016/SVG/main" r:embed="rId6"/>
+              </a:ext>
+            </a:extLst>
+          </a:blip>
+          <a:stretch>
+            <a:fillRect/>
+          </a:stretch>
+        </p:blipFill>
+        <p:spPr>
+          <a:xfrm>
+            <a:off x="3687728" y="6584301"/>
+            <a:ext cx="342517" cy="342517"/>
+          </a:xfrm>
+          <a:prstGeom prst="rect">
+            <a:avLst/>
+          </a:prstGeom>
+        </p:spPr>
+      </p:pic>
+      <p:pic>
+        <p:nvPicPr>
+          <p:cNvPr id="32" name="Ábra 31">
+            <a:extLst>
+              <a:ext uri="{FF2B5EF4-FFF2-40B4-BE49-F238E27FC236}">
+                <a16:creationId xmlns:a16="http://schemas.microsoft.com/office/drawing/2014/main" id="{8117241E-E321-F200-6AAE-E5E1DDB5979C}"/>
+              </a:ext>
+            </a:extLst>
+          </p:cNvPr>
+          <p:cNvPicPr>
+            <a:picLocks noChangeAspect="1"/>
+          </p:cNvPicPr>
+          <p:nvPr/>
+        </p:nvPicPr>
+        <p:blipFill>
+          <a:blip r:embed="rId7">
+            <a:extLst>
+              <a:ext uri="{96DAC541-7B7A-43D3-8B79-37D633B846F1}">
+                <asvg:svgBlip xmlns:asvg="http://schemas.microsoft.com/office/drawing/2016/SVG/main" r:embed="rId8"/>
+              </a:ext>
+            </a:extLst>
+          </a:blip>
+          <a:stretch>
+            <a:fillRect/>
+          </a:stretch>
+        </p:blipFill>
+        <p:spPr>
+          <a:xfrm>
+            <a:off x="3687729" y="5629996"/>
+            <a:ext cx="342517" cy="342517"/>
+          </a:xfrm>
+          <a:prstGeom prst="rect">
+            <a:avLst/>
+          </a:prstGeom>
+        </p:spPr>
+      </p:pic>
+      <p:pic>
+        <p:nvPicPr>
+          <p:cNvPr id="38" name="Ábra 37">
+            <a:extLst>
+              <a:ext uri="{FF2B5EF4-FFF2-40B4-BE49-F238E27FC236}">
+                <a16:creationId xmlns:a16="http://schemas.microsoft.com/office/drawing/2014/main" id="{69B09457-24CE-3BF7-F4B7-1D36E4974023}"/>
+              </a:ext>
+            </a:extLst>
+          </p:cNvPr>
+          <p:cNvPicPr>
+            <a:picLocks noChangeAspect="1"/>
+          </p:cNvPicPr>
+          <p:nvPr/>
+        </p:nvPicPr>
+        <p:blipFill>
+          <a:blip r:embed="rId9">
+            <a:extLst>
+              <a:ext uri="{96DAC541-7B7A-43D3-8B79-37D633B846F1}">
+                <asvg:svgBlip xmlns:asvg="http://schemas.microsoft.com/office/drawing/2016/SVG/main" r:embed="rId10"/>
+              </a:ext>
+            </a:extLst>
+          </a:blip>
+          <a:stretch>
+            <a:fillRect/>
+          </a:stretch>
+        </p:blipFill>
+        <p:spPr>
+          <a:xfrm>
+            <a:off x="334702" y="6478754"/>
+            <a:ext cx="481742" cy="588796"/>
+          </a:xfrm>
+          <a:prstGeom prst="rect">
+            <a:avLst/>
+          </a:prstGeom>
+        </p:spPr>
+      </p:pic>
+      <p:pic>
+        <p:nvPicPr>
+          <p:cNvPr id="16" name="Kép 15" descr="A képen Betűtípus, Grafika, embléma, tipográfia látható&#10;&#10;Előfordulhat, hogy a mesterséges intelligencia által létrehozott tartalom helytelen.">
+            <a:extLst>
+              <a:ext uri="{FF2B5EF4-FFF2-40B4-BE49-F238E27FC236}">
+                <a16:creationId xmlns:a16="http://schemas.microsoft.com/office/drawing/2014/main" id="{18ACABFB-EF87-CB2A-BD33-3072C604237E}"/>
+              </a:ext>
+            </a:extLst>
+          </p:cNvPr>
+          <p:cNvPicPr>
+            <a:picLocks noChangeAspect="1"/>
+          </p:cNvPicPr>
+          <p:nvPr/>
+        </p:nvPicPr>
+        <p:blipFill>
+          <a:blip r:embed="rId11">
+            <a:extLst>
+              <a:ext uri="{28A0092B-C50C-407E-A947-70E740481C1C}">
+                <a14:useLocalDpi xmlns:a14="http://schemas.microsoft.com/office/drawing/2010/main" val="0"/>
+              </a:ext>
+            </a:extLst>
+          </a:blip>
+          <a:stretch>
+            <a:fillRect/>
+          </a:stretch>
+        </p:blipFill>
+        <p:spPr>
+          <a:xfrm>
+            <a:off x="254511" y="7579833"/>
+            <a:ext cx="642124" cy="376330"/>
+          </a:xfrm>
+          <a:prstGeom prst="rect">
+            <a:avLst/>
+          </a:prstGeom>
+        </p:spPr>
+      </p:pic>
+      <p:sp>
+        <p:nvSpPr>
+          <p:cNvPr id="33" name="Szövegdoboz 32">
+            <a:extLst>
+              <a:ext uri="{FF2B5EF4-FFF2-40B4-BE49-F238E27FC236}">
+                <a16:creationId xmlns:a16="http://schemas.microsoft.com/office/drawing/2014/main" id="{B4A7E842-7790-8B44-79EA-BE9378E6DB38}"/>
+              </a:ext>
+            </a:extLst>
+          </p:cNvPr>
+          <p:cNvSpPr txBox="1"/>
+          <p:nvPr/>
+        </p:nvSpPr>
+        <p:spPr>
+          <a:xfrm>
+            <a:off x="1000800" y="7452826"/>
+            <a:ext cx="1626279" cy="369332"/>
+          </a:xfrm>
+          <a:prstGeom prst="rect">
+            <a:avLst/>
+          </a:prstGeom>
+          <a:noFill/>
+        </p:spPr>
+        <p:txBody>
+          <a:bodyPr wrap="none" rtlCol="0">
+            <a:spAutoFit/>
+          </a:bodyPr>
+          <a:lstStyle/>
+          <a:p>
+            <a:r>
+              <a:rPr lang="en-GB" dirty="0" err="1"/>
+              <a:t>Refisz</a:t>
+            </a:r>
+            <a:r>
+              <a:rPr lang="en-GB" dirty="0"/>
+              <a:t> </a:t>
+            </a:r>
+            <a:r>
+              <a:rPr lang="en-GB" dirty="0" err="1"/>
+              <a:t>Kottatár</a:t>
+            </a:r>
+            <a:endParaRPr lang="hu-HU" dirty="0"/>
+          </a:p>
+        </p:txBody>
+      </p:sp>
+      <p:sp>
+        <p:nvSpPr>
+          <p:cNvPr id="34" name="Szövegdoboz 33">
+            <a:extLst>
+              <a:ext uri="{FF2B5EF4-FFF2-40B4-BE49-F238E27FC236}">
+                <a16:creationId xmlns:a16="http://schemas.microsoft.com/office/drawing/2014/main" id="{D6BAB8D6-51FF-F13E-383B-82D88C5FC4E7}"/>
+              </a:ext>
+            </a:extLst>
+          </p:cNvPr>
+          <p:cNvSpPr txBox="1"/>
+          <p:nvPr/>
+        </p:nvSpPr>
+        <p:spPr>
+          <a:xfrm>
+            <a:off x="991998" y="7706466"/>
+            <a:ext cx="753732" cy="307777"/>
+          </a:xfrm>
+          <a:prstGeom prst="rect">
+            <a:avLst/>
+          </a:prstGeom>
+          <a:noFill/>
+        </p:spPr>
+        <p:txBody>
+          <a:bodyPr wrap="none" rtlCol="0">
+            <a:spAutoFit/>
+          </a:bodyPr>
+          <a:lstStyle/>
+          <a:p>
+            <a:r>
+              <a:rPr lang="en-GB" sz="1400" dirty="0"/>
+              <a:t>150 dal</a:t>
+            </a:r>
+            <a:endParaRPr lang="hu-HU" sz="1400" dirty="0"/>
+          </a:p>
+        </p:txBody>
+      </p:sp>
+      <p:sp>
+        <p:nvSpPr>
+          <p:cNvPr id="39" name="Szövegdoboz 38">
+            <a:extLst>
+              <a:ext uri="{FF2B5EF4-FFF2-40B4-BE49-F238E27FC236}">
+                <a16:creationId xmlns:a16="http://schemas.microsoft.com/office/drawing/2014/main" id="{AD0947B6-8FFC-DB89-E443-76D29586E2C6}"/>
+              </a:ext>
+            </a:extLst>
+          </p:cNvPr>
+          <p:cNvSpPr txBox="1"/>
+          <p:nvPr/>
+        </p:nvSpPr>
+        <p:spPr>
+          <a:xfrm>
+            <a:off x="1000800" y="6447924"/>
+            <a:ext cx="1937262" cy="369332"/>
+          </a:xfrm>
+          <a:prstGeom prst="rect">
+            <a:avLst/>
+          </a:prstGeom>
+          <a:noFill/>
+        </p:spPr>
+        <p:txBody>
+          <a:bodyPr wrap="none" rtlCol="0">
+            <a:spAutoFit/>
+          </a:bodyPr>
+          <a:lstStyle/>
+          <a:p>
+            <a:r>
+              <a:rPr lang="en-GB" dirty="0"/>
+              <a:t>csecsy.hu </a:t>
+            </a:r>
+            <a:r>
+              <a:rPr lang="en-GB" dirty="0" err="1"/>
+              <a:t>énekek</a:t>
+            </a:r>
+            <a:endParaRPr lang="hu-HU" dirty="0"/>
+          </a:p>
+        </p:txBody>
+      </p:sp>
+      <p:sp>
+        <p:nvSpPr>
+          <p:cNvPr id="40" name="Szövegdoboz 39">
+            <a:extLst>
+              <a:ext uri="{FF2B5EF4-FFF2-40B4-BE49-F238E27FC236}">
+                <a16:creationId xmlns:a16="http://schemas.microsoft.com/office/drawing/2014/main" id="{59F61C71-BD53-A55E-171D-3A3677ED5C4A}"/>
+              </a:ext>
+            </a:extLst>
+          </p:cNvPr>
+          <p:cNvSpPr txBox="1"/>
+          <p:nvPr/>
+        </p:nvSpPr>
+        <p:spPr>
+          <a:xfrm>
+            <a:off x="991998" y="6733139"/>
+            <a:ext cx="753732" cy="307777"/>
+          </a:xfrm>
+          <a:prstGeom prst="rect">
+            <a:avLst/>
+          </a:prstGeom>
+          <a:noFill/>
+        </p:spPr>
+        <p:txBody>
+          <a:bodyPr wrap="none" rtlCol="0">
+            <a:spAutoFit/>
+          </a:bodyPr>
+          <a:lstStyle/>
+          <a:p>
+            <a:r>
+              <a:rPr lang="en-GB" sz="1400" dirty="0"/>
+              <a:t>250 dal</a:t>
+            </a:r>
+            <a:endParaRPr lang="hu-HU" sz="1400" dirty="0"/>
+          </a:p>
+        </p:txBody>
+      </p:sp>
+      <p:sp>
+        <p:nvSpPr>
+          <p:cNvPr id="41" name="Szövegdoboz 40">
+            <a:extLst>
+              <a:ext uri="{FF2B5EF4-FFF2-40B4-BE49-F238E27FC236}">
+                <a16:creationId xmlns:a16="http://schemas.microsoft.com/office/drawing/2014/main" id="{FAE10408-CA57-A105-8D21-EF5B703AD37A}"/>
+              </a:ext>
+            </a:extLst>
+          </p:cNvPr>
+          <p:cNvSpPr txBox="1"/>
+          <p:nvPr/>
+        </p:nvSpPr>
+        <p:spPr>
+          <a:xfrm>
+            <a:off x="2938062" y="4985610"/>
+            <a:ext cx="1873975" cy="338554"/>
+          </a:xfrm>
+          <a:prstGeom prst="rect">
+            <a:avLst/>
+          </a:prstGeom>
+          <a:noFill/>
+        </p:spPr>
+        <p:txBody>
+          <a:bodyPr wrap="none" rtlCol="0">
+            <a:spAutoFit/>
+          </a:bodyPr>
+          <a:lstStyle/>
+          <a:p>
+            <a:r>
+              <a:rPr lang="en-GB" sz="1600" dirty="0"/>
+              <a:t>Ne </a:t>
+            </a:r>
+            <a:r>
+              <a:rPr lang="en-GB" sz="1600" dirty="0" err="1"/>
+              <a:t>mutassa</a:t>
+            </a:r>
+            <a:r>
+              <a:rPr lang="en-GB" sz="1600" dirty="0"/>
+              <a:t> </a:t>
+            </a:r>
+            <a:r>
+              <a:rPr lang="en-GB" sz="1600" dirty="0" err="1"/>
+              <a:t>többet</a:t>
+            </a:r>
+            <a:endParaRPr lang="hu-HU" sz="1600" dirty="0"/>
+          </a:p>
+        </p:txBody>
+      </p:sp>
+    </p:spTree>
+    <p:extLst>
+      <p:ext uri="{BB962C8B-B14F-4D97-AF65-F5344CB8AC3E}">
+        <p14:creationId xmlns:p14="http://schemas.microsoft.com/office/powerpoint/2010/main" val="2646017205"/>
       </p:ext>
     </p:extLst>
   </p:cSld>

</xml_diff>